<commit_message>
update codepen link in week 3 ppt
</commit_message>
<xml_diff>
--- a/Week03/Lecture.pptx
+++ b/Week03/Lecture.pptx
@@ -215,7 +215,7 @@
           <a:p>
             <a:fld id="{60C6A8C3-8392-4BC1-B99F-0D6991348B0F}" type="datetimeFigureOut">
               <a:rPr lang="en-US" smtClean="0"/>
-              <a:t>10/2/2018</a:t>
+              <a:t>2/24/2020</a:t>
             </a:fld>
             <a:endParaRPr lang="en-US"/>
           </a:p>
@@ -1083,7 +1083,20 @@
           <a:p>
             <a:r>
               <a:rPr lang="en-US" dirty="0" smtClean="0"/>
-              <a:t>For this </a:t>
+              <a:t>https://codepen.io/jmaxwell/pen/YOqLmW?editors=0010</a:t>
+            </a:r>
+          </a:p>
+          <a:p>
+            <a:endParaRPr lang="en-US" dirty="0" smtClean="0"/>
+          </a:p>
+          <a:p>
+            <a:r>
+              <a:rPr lang="en-US" dirty="0" smtClean="0"/>
+              <a:t>For </a:t>
+            </a:r>
+            <a:r>
+              <a:rPr lang="en-US" dirty="0" smtClean="0"/>
+              <a:t>this </a:t>
             </a:r>
             <a:r>
               <a:rPr lang="en-US" dirty="0" err="1" smtClean="0"/>
@@ -2036,7 +2049,7 @@
           <a:p>
             <a:fld id="{61FD5E12-641C-4696-BA65-B86205845F69}" type="datetimeFigureOut">
               <a:rPr lang="en-US" smtClean="0"/>
-              <a:t>10/2/2018</a:t>
+              <a:t>2/24/2020</a:t>
             </a:fld>
             <a:endParaRPr lang="en-US"/>
           </a:p>
@@ -2206,7 +2219,7 @@
           <a:p>
             <a:fld id="{61FD5E12-641C-4696-BA65-B86205845F69}" type="datetimeFigureOut">
               <a:rPr lang="en-US" smtClean="0"/>
-              <a:t>10/2/2018</a:t>
+              <a:t>2/24/2020</a:t>
             </a:fld>
             <a:endParaRPr lang="en-US"/>
           </a:p>
@@ -2386,7 +2399,7 @@
           <a:p>
             <a:fld id="{61FD5E12-641C-4696-BA65-B86205845F69}" type="datetimeFigureOut">
               <a:rPr lang="en-US" smtClean="0"/>
-              <a:t>10/2/2018</a:t>
+              <a:t>2/24/2020</a:t>
             </a:fld>
             <a:endParaRPr lang="en-US"/>
           </a:p>
@@ -3371,7 +3384,7 @@
           <a:p>
             <a:fld id="{61FD5E12-641C-4696-BA65-B86205845F69}" type="datetimeFigureOut">
               <a:rPr lang="en-US" smtClean="0"/>
-              <a:t>10/2/2018</a:t>
+              <a:t>2/24/2020</a:t>
             </a:fld>
             <a:endParaRPr lang="en-US"/>
           </a:p>
@@ -3617,7 +3630,7 @@
           <a:p>
             <a:fld id="{61FD5E12-641C-4696-BA65-B86205845F69}" type="datetimeFigureOut">
               <a:rPr lang="en-US" smtClean="0"/>
-              <a:t>10/2/2018</a:t>
+              <a:t>2/24/2020</a:t>
             </a:fld>
             <a:endParaRPr lang="en-US"/>
           </a:p>
@@ -3849,7 +3862,7 @@
           <a:p>
             <a:fld id="{61FD5E12-641C-4696-BA65-B86205845F69}" type="datetimeFigureOut">
               <a:rPr lang="en-US" smtClean="0"/>
-              <a:t>10/2/2018</a:t>
+              <a:t>2/24/2020</a:t>
             </a:fld>
             <a:endParaRPr lang="en-US"/>
           </a:p>
@@ -4216,7 +4229,7 @@
           <a:p>
             <a:fld id="{61FD5E12-641C-4696-BA65-B86205845F69}" type="datetimeFigureOut">
               <a:rPr lang="en-US" smtClean="0"/>
-              <a:t>10/2/2018</a:t>
+              <a:t>2/24/2020</a:t>
             </a:fld>
             <a:endParaRPr lang="en-US"/>
           </a:p>
@@ -4334,7 +4347,7 @@
           <a:p>
             <a:fld id="{61FD5E12-641C-4696-BA65-B86205845F69}" type="datetimeFigureOut">
               <a:rPr lang="en-US" smtClean="0"/>
-              <a:t>10/2/2018</a:t>
+              <a:t>2/24/2020</a:t>
             </a:fld>
             <a:endParaRPr lang="en-US"/>
           </a:p>
@@ -4429,7 +4442,7 @@
           <a:p>
             <a:fld id="{61FD5E12-641C-4696-BA65-B86205845F69}" type="datetimeFigureOut">
               <a:rPr lang="en-US" smtClean="0"/>
-              <a:t>10/2/2018</a:t>
+              <a:t>2/24/2020</a:t>
             </a:fld>
             <a:endParaRPr lang="en-US"/>
           </a:p>
@@ -4706,7 +4719,7 @@
           <a:p>
             <a:fld id="{61FD5E12-641C-4696-BA65-B86205845F69}" type="datetimeFigureOut">
               <a:rPr lang="en-US" smtClean="0"/>
-              <a:t>10/2/2018</a:t>
+              <a:t>2/24/2020</a:t>
             </a:fld>
             <a:endParaRPr lang="en-US"/>
           </a:p>
@@ -4963,7 +4976,7 @@
           <a:p>
             <a:fld id="{61FD5E12-641C-4696-BA65-B86205845F69}" type="datetimeFigureOut">
               <a:rPr lang="en-US" smtClean="0"/>
-              <a:t>10/2/2018</a:t>
+              <a:t>2/24/2020</a:t>
             </a:fld>
             <a:endParaRPr lang="en-US"/>
           </a:p>
@@ -5176,7 +5189,7 @@
           <a:p>
             <a:fld id="{61FD5E12-641C-4696-BA65-B86205845F69}" type="datetimeFigureOut">
               <a:rPr lang="en-US" smtClean="0"/>
-              <a:t>10/2/2018</a:t>
+              <a:t>2/24/2020</a:t>
             </a:fld>
             <a:endParaRPr lang="en-US"/>
           </a:p>
@@ -7284,16 +7297,10 @@
               <a:buNone/>
             </a:pPr>
             <a:r>
-              <a:rPr lang="en-US" sz="11500" dirty="0" err="1" smtClean="0">
-                <a:hlinkClick r:id="rId3"/>
-              </a:rPr>
-              <a:t>CodePen</a:t>
-            </a:r>
-            <a:r>
               <a:rPr lang="en-US" sz="11500" dirty="0" smtClean="0">
                 <a:hlinkClick r:id="rId3"/>
               </a:rPr>
-              <a:t> !</a:t>
+              <a:t>CodePen !</a:t>
             </a:r>
             <a:endParaRPr lang="en-US" sz="11500" dirty="0"/>
           </a:p>

</xml_diff>